<commit_message>
New logo and updated graphvis
</commit_message>
<xml_diff>
--- a/web/public/sketches.pptx
+++ b/web/public/sketches.pptx
@@ -5,9 +5,7 @@
     <p:sldMasterId id="2147483648" r:id="rId1"/>
   </p:sldMasterIdLst>
   <p:sldIdLst>
-    <p:sldId id="256" r:id="rId2"/>
-    <p:sldId id="258" r:id="rId3"/>
-    <p:sldId id="261" r:id="rId4"/>
+    <p:sldId id="257" r:id="rId2"/>
   </p:sldIdLst>
   <p:sldSz cx="12192000" cy="6858000"/>
   <p:notesSz cx="6858000" cy="9144000"/>
@@ -263,7 +261,7 @@
           <a:p>
             <a:fld id="{DFDFF994-0F5A-E642-96A7-2480334B1E50}" type="datetimeFigureOut">
               <a:rPr lang="en-QA" smtClean="0"/>
-              <a:t>07/10/2021</a:t>
+              <a:t>30/03/2022</a:t>
             </a:fld>
             <a:endParaRPr lang="en-QA"/>
           </a:p>
@@ -463,7 +461,7 @@
           <a:p>
             <a:fld id="{DFDFF994-0F5A-E642-96A7-2480334B1E50}" type="datetimeFigureOut">
               <a:rPr lang="en-QA" smtClean="0"/>
-              <a:t>07/10/2021</a:t>
+              <a:t>30/03/2022</a:t>
             </a:fld>
             <a:endParaRPr lang="en-QA"/>
           </a:p>
@@ -673,7 +671,7 @@
           <a:p>
             <a:fld id="{DFDFF994-0F5A-E642-96A7-2480334B1E50}" type="datetimeFigureOut">
               <a:rPr lang="en-QA" smtClean="0"/>
-              <a:t>07/10/2021</a:t>
+              <a:t>30/03/2022</a:t>
             </a:fld>
             <a:endParaRPr lang="en-QA"/>
           </a:p>
@@ -873,7 +871,7 @@
           <a:p>
             <a:fld id="{DFDFF994-0F5A-E642-96A7-2480334B1E50}" type="datetimeFigureOut">
               <a:rPr lang="en-QA" smtClean="0"/>
-              <a:t>07/10/2021</a:t>
+              <a:t>30/03/2022</a:t>
             </a:fld>
             <a:endParaRPr lang="en-QA"/>
           </a:p>
@@ -1149,7 +1147,7 @@
           <a:p>
             <a:fld id="{DFDFF994-0F5A-E642-96A7-2480334B1E50}" type="datetimeFigureOut">
               <a:rPr lang="en-QA" smtClean="0"/>
-              <a:t>07/10/2021</a:t>
+              <a:t>30/03/2022</a:t>
             </a:fld>
             <a:endParaRPr lang="en-QA"/>
           </a:p>
@@ -1417,7 +1415,7 @@
           <a:p>
             <a:fld id="{DFDFF994-0F5A-E642-96A7-2480334B1E50}" type="datetimeFigureOut">
               <a:rPr lang="en-QA" smtClean="0"/>
-              <a:t>07/10/2021</a:t>
+              <a:t>30/03/2022</a:t>
             </a:fld>
             <a:endParaRPr lang="en-QA"/>
           </a:p>
@@ -1832,7 +1830,7 @@
           <a:p>
             <a:fld id="{DFDFF994-0F5A-E642-96A7-2480334B1E50}" type="datetimeFigureOut">
               <a:rPr lang="en-QA" smtClean="0"/>
-              <a:t>07/10/2021</a:t>
+              <a:t>30/03/2022</a:t>
             </a:fld>
             <a:endParaRPr lang="en-QA"/>
           </a:p>
@@ -1974,7 +1972,7 @@
           <a:p>
             <a:fld id="{DFDFF994-0F5A-E642-96A7-2480334B1E50}" type="datetimeFigureOut">
               <a:rPr lang="en-QA" smtClean="0"/>
-              <a:t>07/10/2021</a:t>
+              <a:t>30/03/2022</a:t>
             </a:fld>
             <a:endParaRPr lang="en-QA"/>
           </a:p>
@@ -2087,7 +2085,7 @@
           <a:p>
             <a:fld id="{DFDFF994-0F5A-E642-96A7-2480334B1E50}" type="datetimeFigureOut">
               <a:rPr lang="en-QA" smtClean="0"/>
-              <a:t>07/10/2021</a:t>
+              <a:t>30/03/2022</a:t>
             </a:fld>
             <a:endParaRPr lang="en-QA"/>
           </a:p>
@@ -2400,7 +2398,7 @@
           <a:p>
             <a:fld id="{DFDFF994-0F5A-E642-96A7-2480334B1E50}" type="datetimeFigureOut">
               <a:rPr lang="en-QA" smtClean="0"/>
-              <a:t>07/10/2021</a:t>
+              <a:t>30/03/2022</a:t>
             </a:fld>
             <a:endParaRPr lang="en-QA"/>
           </a:p>
@@ -2689,7 +2687,7 @@
           <a:p>
             <a:fld id="{DFDFF994-0F5A-E642-96A7-2480334B1E50}" type="datetimeFigureOut">
               <a:rPr lang="en-QA" smtClean="0"/>
-              <a:t>07/10/2021</a:t>
+              <a:t>30/03/2022</a:t>
             </a:fld>
             <a:endParaRPr lang="en-QA"/>
           </a:p>
@@ -2932,7 +2930,7 @@
           <a:p>
             <a:fld id="{DFDFF994-0F5A-E642-96A7-2480334B1E50}" type="datetimeFigureOut">
               <a:rPr lang="en-QA" smtClean="0"/>
-              <a:t>07/10/2021</a:t>
+              <a:t>30/03/2022</a:t>
             </a:fld>
             <a:endParaRPr lang="en-QA"/>
           </a:p>
@@ -3335,14 +3333,6 @@
 <file path=ppt/slides/slide1.xml><?xml version="1.0" encoding="utf-8"?>
 <p:sld xmlns:a="http://schemas.openxmlformats.org/drawingml/2006/main" xmlns:r="http://schemas.openxmlformats.org/officeDocument/2006/relationships" xmlns:p="http://schemas.openxmlformats.org/presentationml/2006/main">
   <p:cSld>
-    <p:bg>
-      <p:bgPr>
-        <a:solidFill>
-          <a:srgbClr val="FFFFFF"/>
-        </a:solidFill>
-        <a:effectLst/>
-      </p:bgPr>
-    </p:bg>
     <p:spTree>
       <p:nvGrpSpPr>
         <p:cNvPr id="1" name=""/>
@@ -3359,10 +3349,10 @@
       </p:grpSpPr>
       <p:grpSp>
         <p:nvGrpSpPr>
-          <p:cNvPr id="15" name="Group 14">
-            <a:extLst>
-              <a:ext uri="{FF2B5EF4-FFF2-40B4-BE49-F238E27FC236}">
-                <a16:creationId xmlns:a16="http://schemas.microsoft.com/office/drawing/2014/main" id="{6B56ADC7-6CBA-DC46-8DE9-067737F566D1}"/>
+          <p:cNvPr id="12" name="Group 11">
+            <a:extLst>
+              <a:ext uri="{FF2B5EF4-FFF2-40B4-BE49-F238E27FC236}">
+                <a16:creationId xmlns:a16="http://schemas.microsoft.com/office/drawing/2014/main" id="{3501B9C5-3D6C-6A42-8E3C-D40C72BB8822}"/>
               </a:ext>
             </a:extLst>
           </p:cNvPr>
@@ -3371,311 +3361,18 @@
         </p:nvGrpSpPr>
         <p:grpSpPr>
           <a:xfrm>
-            <a:off x="5016000" y="2384974"/>
-            <a:ext cx="2160000" cy="2160000"/>
-            <a:chOff x="5016000" y="2384974"/>
-            <a:chExt cx="2160000" cy="2160000"/>
+            <a:off x="5016000" y="2388574"/>
+            <a:ext cx="2160000" cy="2156400"/>
+            <a:chOff x="5016000" y="2388574"/>
+            <a:chExt cx="2160000" cy="2156400"/>
           </a:xfrm>
         </p:grpSpPr>
-        <p:grpSp>
-          <p:nvGrpSpPr>
-            <p:cNvPr id="12" name="Group 11">
+        <p:sp>
+          <p:nvSpPr>
+            <p:cNvPr id="4" name="Oval 3">
               <a:extLst>
                 <a:ext uri="{FF2B5EF4-FFF2-40B4-BE49-F238E27FC236}">
-                  <a16:creationId xmlns:a16="http://schemas.microsoft.com/office/drawing/2014/main" id="{3501B9C5-3D6C-6A42-8E3C-D40C72BB8822}"/>
-                </a:ext>
-              </a:extLst>
-            </p:cNvPr>
-            <p:cNvGrpSpPr/>
-            <p:nvPr/>
-          </p:nvGrpSpPr>
-          <p:grpSpPr>
-            <a:xfrm>
-              <a:off x="5016000" y="2388574"/>
-              <a:ext cx="2160000" cy="2156400"/>
-              <a:chOff x="5016000" y="2388574"/>
-              <a:chExt cx="2160000" cy="2156400"/>
-            </a:xfrm>
-          </p:grpSpPr>
-          <p:sp>
-            <p:nvSpPr>
-              <p:cNvPr id="4" name="Oval 3">
-                <a:extLst>
-                  <a:ext uri="{FF2B5EF4-FFF2-40B4-BE49-F238E27FC236}">
-                    <a16:creationId xmlns:a16="http://schemas.microsoft.com/office/drawing/2014/main" id="{0DE46409-99C4-3E43-A172-D7AAA0540EB4}"/>
-                  </a:ext>
-                </a:extLst>
-              </p:cNvPr>
-              <p:cNvSpPr>
-                <a:spLocks noChangeAspect="1"/>
-              </p:cNvSpPr>
-              <p:nvPr/>
-            </p:nvSpPr>
-            <p:spPr>
-              <a:xfrm>
-                <a:off x="5016000" y="2388574"/>
-                <a:ext cx="2160000" cy="2156400"/>
-              </a:xfrm>
-              <a:prstGeom prst="ellipse">
-                <a:avLst/>
-              </a:prstGeom>
-              <a:solidFill>
-                <a:srgbClr val="1976D2"/>
-              </a:solidFill>
-              <a:ln>
-                <a:solidFill>
-                  <a:srgbClr val="1976D2"/>
-                </a:solidFill>
-              </a:ln>
-            </p:spPr>
-            <p:style>
-              <a:lnRef idx="2">
-                <a:schemeClr val="accent1">
-                  <a:shade val="50000"/>
-                </a:schemeClr>
-              </a:lnRef>
-              <a:fillRef idx="1">
-                <a:schemeClr val="accent1"/>
-              </a:fillRef>
-              <a:effectRef idx="0">
-                <a:schemeClr val="accent1"/>
-              </a:effectRef>
-              <a:fontRef idx="minor">
-                <a:schemeClr val="lt1"/>
-              </a:fontRef>
-            </p:style>
-            <p:txBody>
-              <a:bodyPr rtlCol="0" anchor="ctr"/>
-              <a:lstStyle/>
-              <a:p>
-                <a:pPr algn="ctr"/>
-                <a:endParaRPr lang="en-QA"/>
-              </a:p>
-            </p:txBody>
-          </p:sp>
-          <p:sp>
-            <p:nvSpPr>
-              <p:cNvPr id="5" name="Oval 4">
-                <a:extLst>
-                  <a:ext uri="{FF2B5EF4-FFF2-40B4-BE49-F238E27FC236}">
-                    <a16:creationId xmlns:a16="http://schemas.microsoft.com/office/drawing/2014/main" id="{F07560F9-205D-454F-9CF1-175AC9B796F6}"/>
-                  </a:ext>
-                </a:extLst>
-              </p:cNvPr>
-              <p:cNvSpPr>
-                <a:spLocks noChangeAspect="1"/>
-              </p:cNvSpPr>
-              <p:nvPr/>
-            </p:nvSpPr>
-            <p:spPr>
-              <a:xfrm>
-                <a:off x="5196000" y="2566774"/>
-                <a:ext cx="1800000" cy="1800000"/>
-              </a:xfrm>
-              <a:prstGeom prst="ellipse">
-                <a:avLst/>
-              </a:prstGeom>
-              <a:solidFill>
-                <a:srgbClr val="8376D2"/>
-              </a:solidFill>
-              <a:ln w="38100">
-                <a:noFill/>
-              </a:ln>
-            </p:spPr>
-            <p:style>
-              <a:lnRef idx="2">
-                <a:schemeClr val="accent1">
-                  <a:shade val="50000"/>
-                </a:schemeClr>
-              </a:lnRef>
-              <a:fillRef idx="1">
-                <a:schemeClr val="accent1"/>
-              </a:fillRef>
-              <a:effectRef idx="0">
-                <a:schemeClr val="accent1"/>
-              </a:effectRef>
-              <a:fontRef idx="minor">
-                <a:schemeClr val="lt1"/>
-              </a:fontRef>
-            </p:style>
-            <p:txBody>
-              <a:bodyPr rtlCol="0" anchor="ctr"/>
-              <a:lstStyle/>
-              <a:p>
-                <a:pPr algn="ctr"/>
-                <a:endParaRPr lang="en-QA"/>
-              </a:p>
-            </p:txBody>
-          </p:sp>
-          <p:sp>
-            <p:nvSpPr>
-              <p:cNvPr id="9" name="Oval 8">
-                <a:extLst>
-                  <a:ext uri="{FF2B5EF4-FFF2-40B4-BE49-F238E27FC236}">
-                    <a16:creationId xmlns:a16="http://schemas.microsoft.com/office/drawing/2014/main" id="{117CD5F2-82FC-2345-BF18-DB8B3835514F}"/>
-                  </a:ext>
-                </a:extLst>
-              </p:cNvPr>
-              <p:cNvSpPr>
-                <a:spLocks noChangeAspect="1"/>
-              </p:cNvSpPr>
-              <p:nvPr/>
-            </p:nvSpPr>
-            <p:spPr>
-              <a:xfrm>
-                <a:off x="5376000" y="2746774"/>
-                <a:ext cx="1440000" cy="1440000"/>
-              </a:xfrm>
-              <a:prstGeom prst="ellipse">
-                <a:avLst/>
-              </a:prstGeom>
-              <a:solidFill>
-                <a:srgbClr val="7FD0D2"/>
-              </a:solidFill>
-              <a:ln w="38100">
-                <a:noFill/>
-              </a:ln>
-            </p:spPr>
-            <p:style>
-              <a:lnRef idx="2">
-                <a:schemeClr val="accent1">
-                  <a:shade val="50000"/>
-                </a:schemeClr>
-              </a:lnRef>
-              <a:fillRef idx="1">
-                <a:schemeClr val="accent1"/>
-              </a:fillRef>
-              <a:effectRef idx="0">
-                <a:schemeClr val="accent1"/>
-              </a:effectRef>
-              <a:fontRef idx="minor">
-                <a:schemeClr val="lt1"/>
-              </a:fontRef>
-            </p:style>
-            <p:txBody>
-              <a:bodyPr rtlCol="0" anchor="ctr"/>
-              <a:lstStyle/>
-              <a:p>
-                <a:pPr algn="ctr"/>
-                <a:endParaRPr lang="en-QA"/>
-              </a:p>
-            </p:txBody>
-          </p:sp>
-          <p:sp>
-            <p:nvSpPr>
-              <p:cNvPr id="10" name="Oval 9">
-                <a:extLst>
-                  <a:ext uri="{FF2B5EF4-FFF2-40B4-BE49-F238E27FC236}">
-                    <a16:creationId xmlns:a16="http://schemas.microsoft.com/office/drawing/2014/main" id="{AF3D9770-EFD0-5F4D-8F97-7F753742C217}"/>
-                  </a:ext>
-                </a:extLst>
-              </p:cNvPr>
-              <p:cNvSpPr>
-                <a:spLocks noChangeAspect="1"/>
-              </p:cNvSpPr>
-              <p:nvPr/>
-            </p:nvSpPr>
-            <p:spPr>
-              <a:xfrm>
-                <a:off x="5556000" y="2926774"/>
-                <a:ext cx="1080000" cy="1080000"/>
-              </a:xfrm>
-              <a:prstGeom prst="ellipse">
-                <a:avLst/>
-              </a:prstGeom>
-              <a:solidFill>
-                <a:srgbClr val="FFD0D2"/>
-              </a:solidFill>
-              <a:ln w="38100">
-                <a:noFill/>
-              </a:ln>
-            </p:spPr>
-            <p:style>
-              <a:lnRef idx="2">
-                <a:schemeClr val="accent1">
-                  <a:shade val="50000"/>
-                </a:schemeClr>
-              </a:lnRef>
-              <a:fillRef idx="1">
-                <a:schemeClr val="accent1"/>
-              </a:fillRef>
-              <a:effectRef idx="0">
-                <a:schemeClr val="accent1"/>
-              </a:effectRef>
-              <a:fontRef idx="minor">
-                <a:schemeClr val="lt1"/>
-              </a:fontRef>
-            </p:style>
-            <p:txBody>
-              <a:bodyPr rtlCol="0" anchor="ctr"/>
-              <a:lstStyle/>
-              <a:p>
-                <a:pPr algn="ctr"/>
-                <a:endParaRPr lang="en-QA"/>
-              </a:p>
-            </p:txBody>
-          </p:sp>
-          <p:sp>
-            <p:nvSpPr>
-              <p:cNvPr id="11" name="Oval 10">
-                <a:extLst>
-                  <a:ext uri="{FF2B5EF4-FFF2-40B4-BE49-F238E27FC236}">
-                    <a16:creationId xmlns:a16="http://schemas.microsoft.com/office/drawing/2014/main" id="{150FB188-0C83-EB49-861A-AE6AB69A79E4}"/>
-                  </a:ext>
-                </a:extLst>
-              </p:cNvPr>
-              <p:cNvSpPr>
-                <a:spLocks noChangeAspect="1"/>
-              </p:cNvSpPr>
-              <p:nvPr/>
-            </p:nvSpPr>
-            <p:spPr>
-              <a:xfrm>
-                <a:off x="5736000" y="3106774"/>
-                <a:ext cx="720000" cy="720000"/>
-              </a:xfrm>
-              <a:prstGeom prst="ellipse">
-                <a:avLst/>
-              </a:prstGeom>
-              <a:solidFill>
-                <a:srgbClr val="FFFFD2"/>
-              </a:solidFill>
-              <a:ln w="38100">
-                <a:noFill/>
-              </a:ln>
-            </p:spPr>
-            <p:style>
-              <a:lnRef idx="2">
-                <a:schemeClr val="accent1">
-                  <a:shade val="50000"/>
-                </a:schemeClr>
-              </a:lnRef>
-              <a:fillRef idx="1">
-                <a:schemeClr val="accent1"/>
-              </a:fillRef>
-              <a:effectRef idx="0">
-                <a:schemeClr val="accent1"/>
-              </a:effectRef>
-              <a:fontRef idx="minor">
-                <a:schemeClr val="lt1"/>
-              </a:fontRef>
-            </p:style>
-            <p:txBody>
-              <a:bodyPr rtlCol="0" anchor="ctr"/>
-              <a:lstStyle/>
-              <a:p>
-                <a:pPr algn="ctr"/>
-                <a:endParaRPr lang="en-QA"/>
-              </a:p>
-            </p:txBody>
-          </p:sp>
-        </p:grpSp>
-        <p:sp>
-          <p:nvSpPr>
-            <p:cNvPr id="13" name="Pie 12">
-              <a:extLst>
-                <a:ext uri="{FF2B5EF4-FFF2-40B4-BE49-F238E27FC236}">
-                  <a16:creationId xmlns:a16="http://schemas.microsoft.com/office/drawing/2014/main" id="{597E1B90-BD26-B541-BBB8-67143EF37248}"/>
+                  <a16:creationId xmlns:a16="http://schemas.microsoft.com/office/drawing/2014/main" id="{0DE46409-99C4-3E43-A172-D7AAA0540EB4}"/>
                 </a:ext>
               </a:extLst>
             </p:cNvPr>
@@ -3685,20 +3382,73 @@
             <p:nvPr/>
           </p:nvSpPr>
           <p:spPr>
-            <a:xfrm rot="16200000">
-              <a:off x="5016000" y="2384974"/>
-              <a:ext cx="2160000" cy="2160000"/>
+            <a:xfrm>
+              <a:off x="5016000" y="2388574"/>
+              <a:ext cx="2160000" cy="2156400"/>
             </a:xfrm>
-            <a:prstGeom prst="pie">
-              <a:avLst>
-                <a:gd name="adj1" fmla="val 0"/>
-                <a:gd name="adj2" fmla="val 10812754"/>
-              </a:avLst>
+            <a:prstGeom prst="ellipse">
+              <a:avLst/>
             </a:prstGeom>
             <a:solidFill>
               <a:srgbClr val="1976D2"/>
             </a:solidFill>
             <a:ln>
+              <a:solidFill>
+                <a:srgbClr val="1976D2"/>
+              </a:solidFill>
+            </a:ln>
+          </p:spPr>
+          <p:style>
+            <a:lnRef idx="2">
+              <a:schemeClr val="accent1">
+                <a:shade val="50000"/>
+              </a:schemeClr>
+            </a:lnRef>
+            <a:fillRef idx="1">
+              <a:schemeClr val="accent1"/>
+            </a:fillRef>
+            <a:effectRef idx="0">
+              <a:schemeClr val="accent1"/>
+            </a:effectRef>
+            <a:fontRef idx="minor">
+              <a:schemeClr val="lt1"/>
+            </a:fontRef>
+          </p:style>
+          <p:txBody>
+            <a:bodyPr rtlCol="0" anchor="ctr"/>
+            <a:lstStyle/>
+            <a:p>
+              <a:pPr algn="ctr"/>
+              <a:endParaRPr lang="en-QA"/>
+            </a:p>
+          </p:txBody>
+        </p:sp>
+        <p:sp>
+          <p:nvSpPr>
+            <p:cNvPr id="9" name="Oval 8">
+              <a:extLst>
+                <a:ext uri="{FF2B5EF4-FFF2-40B4-BE49-F238E27FC236}">
+                  <a16:creationId xmlns:a16="http://schemas.microsoft.com/office/drawing/2014/main" id="{117CD5F2-82FC-2345-BF18-DB8B3835514F}"/>
+                </a:ext>
+              </a:extLst>
+            </p:cNvPr>
+            <p:cNvSpPr>
+              <a:spLocks noChangeAspect="1"/>
+            </p:cNvSpPr>
+            <p:nvPr/>
+          </p:nvSpPr>
+          <p:spPr>
+            <a:xfrm>
+              <a:off x="5376000" y="2746774"/>
+              <a:ext cx="1440000" cy="1440000"/>
+            </a:xfrm>
+            <a:prstGeom prst="ellipse">
+              <a:avLst/>
+            </a:prstGeom>
+            <a:solidFill>
+              <a:srgbClr val="90CAF9"/>
+            </a:solidFill>
+            <a:ln w="38100">
               <a:noFill/>
             </a:ln>
           </p:spPr>
@@ -3723,11 +3473,7 @@
             <a:lstStyle/>
             <a:p>
               <a:pPr algn="ctr"/>
-              <a:endParaRPr lang="en-QA" dirty="0">
-                <a:solidFill>
-                  <a:schemeClr val="tx1"/>
-                </a:solidFill>
-              </a:endParaRPr>
+              <a:endParaRPr lang="en-QA"/>
             </a:p>
           </p:txBody>
         </p:sp>
@@ -3735,725 +3481,7 @@
     </p:spTree>
     <p:extLst>
       <p:ext uri="{BB962C8B-B14F-4D97-AF65-F5344CB8AC3E}">
-        <p14:creationId xmlns:p14="http://schemas.microsoft.com/office/powerpoint/2010/main" val="3168197041"/>
-      </p:ext>
-    </p:extLst>
-  </p:cSld>
-  <p:clrMapOvr>
-    <a:masterClrMapping/>
-  </p:clrMapOvr>
-</p:sld>
-</file>
-
-<file path=ppt/slides/slide2.xml><?xml version="1.0" encoding="utf-8"?>
-<p:sld xmlns:a="http://schemas.openxmlformats.org/drawingml/2006/main" xmlns:r="http://schemas.openxmlformats.org/officeDocument/2006/relationships" xmlns:p="http://schemas.openxmlformats.org/presentationml/2006/main">
-  <p:cSld>
-    <p:spTree>
-      <p:nvGrpSpPr>
-        <p:cNvPr id="1" name=""/>
-        <p:cNvGrpSpPr/>
-        <p:nvPr/>
-      </p:nvGrpSpPr>
-      <p:grpSpPr>
-        <a:xfrm>
-          <a:off x="0" y="0"/>
-          <a:ext cx="0" cy="0"/>
-          <a:chOff x="0" y="0"/>
-          <a:chExt cx="0" cy="0"/>
-        </a:xfrm>
-      </p:grpSpPr>
-      <p:grpSp>
-        <p:nvGrpSpPr>
-          <p:cNvPr id="3" name="Group 2">
-            <a:extLst>
-              <a:ext uri="{FF2B5EF4-FFF2-40B4-BE49-F238E27FC236}">
-                <a16:creationId xmlns:a16="http://schemas.microsoft.com/office/drawing/2014/main" id="{5177455B-5384-5D45-8CFB-07B75A22AFFF}"/>
-              </a:ext>
-            </a:extLst>
-          </p:cNvPr>
-          <p:cNvGrpSpPr/>
-          <p:nvPr/>
-        </p:nvGrpSpPr>
-        <p:grpSpPr>
-          <a:xfrm>
-            <a:off x="1887980" y="2147189"/>
-            <a:ext cx="8711959" cy="2160000"/>
-            <a:chOff x="1979836" y="2349000"/>
-            <a:chExt cx="8711959" cy="2160000"/>
-          </a:xfrm>
-        </p:grpSpPr>
-        <p:grpSp>
-          <p:nvGrpSpPr>
-            <p:cNvPr id="15" name="Group 14">
-              <a:extLst>
-                <a:ext uri="{FF2B5EF4-FFF2-40B4-BE49-F238E27FC236}">
-                  <a16:creationId xmlns:a16="http://schemas.microsoft.com/office/drawing/2014/main" id="{6B56ADC7-6CBA-DC46-8DE9-067737F566D1}"/>
-                </a:ext>
-              </a:extLst>
-            </p:cNvPr>
-            <p:cNvGrpSpPr/>
-            <p:nvPr/>
-          </p:nvGrpSpPr>
-          <p:grpSpPr>
-            <a:xfrm>
-              <a:off x="1979836" y="2349000"/>
-              <a:ext cx="2160000" cy="2160000"/>
-              <a:chOff x="5016000" y="2384974"/>
-              <a:chExt cx="2160000" cy="2160000"/>
-            </a:xfrm>
-          </p:grpSpPr>
-          <p:grpSp>
-            <p:nvGrpSpPr>
-              <p:cNvPr id="12" name="Group 11">
-                <a:extLst>
-                  <a:ext uri="{FF2B5EF4-FFF2-40B4-BE49-F238E27FC236}">
-                    <a16:creationId xmlns:a16="http://schemas.microsoft.com/office/drawing/2014/main" id="{3501B9C5-3D6C-6A42-8E3C-D40C72BB8822}"/>
-                  </a:ext>
-                </a:extLst>
-              </p:cNvPr>
-              <p:cNvGrpSpPr/>
-              <p:nvPr/>
-            </p:nvGrpSpPr>
-            <p:grpSpPr>
-              <a:xfrm>
-                <a:off x="5016000" y="2388574"/>
-                <a:ext cx="2160000" cy="2156400"/>
-                <a:chOff x="5016000" y="2388574"/>
-                <a:chExt cx="2160000" cy="2156400"/>
-              </a:xfrm>
-            </p:grpSpPr>
-            <p:sp>
-              <p:nvSpPr>
-                <p:cNvPr id="4" name="Oval 3">
-                  <a:extLst>
-                    <a:ext uri="{FF2B5EF4-FFF2-40B4-BE49-F238E27FC236}">
-                      <a16:creationId xmlns:a16="http://schemas.microsoft.com/office/drawing/2014/main" id="{0DE46409-99C4-3E43-A172-D7AAA0540EB4}"/>
-                    </a:ext>
-                  </a:extLst>
-                </p:cNvPr>
-                <p:cNvSpPr>
-                  <a:spLocks noChangeAspect="1"/>
-                </p:cNvSpPr>
-                <p:nvPr/>
-              </p:nvSpPr>
-              <p:spPr>
-                <a:xfrm>
-                  <a:off x="5016000" y="2388574"/>
-                  <a:ext cx="2160000" cy="2156400"/>
-                </a:xfrm>
-                <a:prstGeom prst="ellipse">
-                  <a:avLst/>
-                </a:prstGeom>
-                <a:solidFill>
-                  <a:srgbClr val="1976D2"/>
-                </a:solidFill>
-                <a:ln>
-                  <a:solidFill>
-                    <a:srgbClr val="1976D2"/>
-                  </a:solidFill>
-                </a:ln>
-              </p:spPr>
-              <p:style>
-                <a:lnRef idx="2">
-                  <a:schemeClr val="accent1">
-                    <a:shade val="50000"/>
-                  </a:schemeClr>
-                </a:lnRef>
-                <a:fillRef idx="1">
-                  <a:schemeClr val="accent1"/>
-                </a:fillRef>
-                <a:effectRef idx="0">
-                  <a:schemeClr val="accent1"/>
-                </a:effectRef>
-                <a:fontRef idx="minor">
-                  <a:schemeClr val="lt1"/>
-                </a:fontRef>
-              </p:style>
-              <p:txBody>
-                <a:bodyPr rtlCol="0" anchor="ctr"/>
-                <a:lstStyle/>
-                <a:p>
-                  <a:pPr algn="ctr"/>
-                  <a:endParaRPr lang="en-QA"/>
-                </a:p>
-              </p:txBody>
-            </p:sp>
-            <p:sp>
-              <p:nvSpPr>
-                <p:cNvPr id="5" name="Oval 4">
-                  <a:extLst>
-                    <a:ext uri="{FF2B5EF4-FFF2-40B4-BE49-F238E27FC236}">
-                      <a16:creationId xmlns:a16="http://schemas.microsoft.com/office/drawing/2014/main" id="{F07560F9-205D-454F-9CF1-175AC9B796F6}"/>
-                    </a:ext>
-                  </a:extLst>
-                </p:cNvPr>
-                <p:cNvSpPr>
-                  <a:spLocks noChangeAspect="1"/>
-                </p:cNvSpPr>
-                <p:nvPr/>
-              </p:nvSpPr>
-              <p:spPr>
-                <a:xfrm>
-                  <a:off x="5196000" y="2566774"/>
-                  <a:ext cx="1800000" cy="1800000"/>
-                </a:xfrm>
-                <a:prstGeom prst="ellipse">
-                  <a:avLst/>
-                </a:prstGeom>
-                <a:solidFill>
-                  <a:srgbClr val="8376D2"/>
-                </a:solidFill>
-                <a:ln w="38100">
-                  <a:noFill/>
-                </a:ln>
-              </p:spPr>
-              <p:style>
-                <a:lnRef idx="2">
-                  <a:schemeClr val="accent1">
-                    <a:shade val="50000"/>
-                  </a:schemeClr>
-                </a:lnRef>
-                <a:fillRef idx="1">
-                  <a:schemeClr val="accent1"/>
-                </a:fillRef>
-                <a:effectRef idx="0">
-                  <a:schemeClr val="accent1"/>
-                </a:effectRef>
-                <a:fontRef idx="minor">
-                  <a:schemeClr val="lt1"/>
-                </a:fontRef>
-              </p:style>
-              <p:txBody>
-                <a:bodyPr rtlCol="0" anchor="ctr"/>
-                <a:lstStyle/>
-                <a:p>
-                  <a:pPr algn="ctr"/>
-                  <a:endParaRPr lang="en-QA"/>
-                </a:p>
-              </p:txBody>
-            </p:sp>
-            <p:sp>
-              <p:nvSpPr>
-                <p:cNvPr id="9" name="Oval 8">
-                  <a:extLst>
-                    <a:ext uri="{FF2B5EF4-FFF2-40B4-BE49-F238E27FC236}">
-                      <a16:creationId xmlns:a16="http://schemas.microsoft.com/office/drawing/2014/main" id="{117CD5F2-82FC-2345-BF18-DB8B3835514F}"/>
-                    </a:ext>
-                  </a:extLst>
-                </p:cNvPr>
-                <p:cNvSpPr>
-                  <a:spLocks noChangeAspect="1"/>
-                </p:cNvSpPr>
-                <p:nvPr/>
-              </p:nvSpPr>
-              <p:spPr>
-                <a:xfrm>
-                  <a:off x="5376000" y="2746774"/>
-                  <a:ext cx="1440000" cy="1440000"/>
-                </a:xfrm>
-                <a:prstGeom prst="ellipse">
-                  <a:avLst/>
-                </a:prstGeom>
-                <a:solidFill>
-                  <a:srgbClr val="7FD0D2"/>
-                </a:solidFill>
-                <a:ln w="38100">
-                  <a:noFill/>
-                </a:ln>
-              </p:spPr>
-              <p:style>
-                <a:lnRef idx="2">
-                  <a:schemeClr val="accent1">
-                    <a:shade val="50000"/>
-                  </a:schemeClr>
-                </a:lnRef>
-                <a:fillRef idx="1">
-                  <a:schemeClr val="accent1"/>
-                </a:fillRef>
-                <a:effectRef idx="0">
-                  <a:schemeClr val="accent1"/>
-                </a:effectRef>
-                <a:fontRef idx="minor">
-                  <a:schemeClr val="lt1"/>
-                </a:fontRef>
-              </p:style>
-              <p:txBody>
-                <a:bodyPr rtlCol="0" anchor="ctr"/>
-                <a:lstStyle/>
-                <a:p>
-                  <a:pPr algn="ctr"/>
-                  <a:endParaRPr lang="en-QA"/>
-                </a:p>
-              </p:txBody>
-            </p:sp>
-            <p:sp>
-              <p:nvSpPr>
-                <p:cNvPr id="10" name="Oval 9">
-                  <a:extLst>
-                    <a:ext uri="{FF2B5EF4-FFF2-40B4-BE49-F238E27FC236}">
-                      <a16:creationId xmlns:a16="http://schemas.microsoft.com/office/drawing/2014/main" id="{AF3D9770-EFD0-5F4D-8F97-7F753742C217}"/>
-                    </a:ext>
-                  </a:extLst>
-                </p:cNvPr>
-                <p:cNvSpPr>
-                  <a:spLocks noChangeAspect="1"/>
-                </p:cNvSpPr>
-                <p:nvPr/>
-              </p:nvSpPr>
-              <p:spPr>
-                <a:xfrm>
-                  <a:off x="5556000" y="2926774"/>
-                  <a:ext cx="1080000" cy="1080000"/>
-                </a:xfrm>
-                <a:prstGeom prst="ellipse">
-                  <a:avLst/>
-                </a:prstGeom>
-                <a:solidFill>
-                  <a:srgbClr val="FFD0D2"/>
-                </a:solidFill>
-                <a:ln w="38100">
-                  <a:noFill/>
-                </a:ln>
-              </p:spPr>
-              <p:style>
-                <a:lnRef idx="2">
-                  <a:schemeClr val="accent1">
-                    <a:shade val="50000"/>
-                  </a:schemeClr>
-                </a:lnRef>
-                <a:fillRef idx="1">
-                  <a:schemeClr val="accent1"/>
-                </a:fillRef>
-                <a:effectRef idx="0">
-                  <a:schemeClr val="accent1"/>
-                </a:effectRef>
-                <a:fontRef idx="minor">
-                  <a:schemeClr val="lt1"/>
-                </a:fontRef>
-              </p:style>
-              <p:txBody>
-                <a:bodyPr rtlCol="0" anchor="ctr"/>
-                <a:lstStyle/>
-                <a:p>
-                  <a:pPr algn="ctr"/>
-                  <a:endParaRPr lang="en-QA"/>
-                </a:p>
-              </p:txBody>
-            </p:sp>
-            <p:sp>
-              <p:nvSpPr>
-                <p:cNvPr id="11" name="Oval 10">
-                  <a:extLst>
-                    <a:ext uri="{FF2B5EF4-FFF2-40B4-BE49-F238E27FC236}">
-                      <a16:creationId xmlns:a16="http://schemas.microsoft.com/office/drawing/2014/main" id="{150FB188-0C83-EB49-861A-AE6AB69A79E4}"/>
-                    </a:ext>
-                  </a:extLst>
-                </p:cNvPr>
-                <p:cNvSpPr>
-                  <a:spLocks noChangeAspect="1"/>
-                </p:cNvSpPr>
-                <p:nvPr/>
-              </p:nvSpPr>
-              <p:spPr>
-                <a:xfrm>
-                  <a:off x="5736000" y="3106774"/>
-                  <a:ext cx="720000" cy="720000"/>
-                </a:xfrm>
-                <a:prstGeom prst="ellipse">
-                  <a:avLst/>
-                </a:prstGeom>
-                <a:solidFill>
-                  <a:srgbClr val="FFFFD2"/>
-                </a:solidFill>
-                <a:ln w="38100">
-                  <a:noFill/>
-                </a:ln>
-              </p:spPr>
-              <p:style>
-                <a:lnRef idx="2">
-                  <a:schemeClr val="accent1">
-                    <a:shade val="50000"/>
-                  </a:schemeClr>
-                </a:lnRef>
-                <a:fillRef idx="1">
-                  <a:schemeClr val="accent1"/>
-                </a:fillRef>
-                <a:effectRef idx="0">
-                  <a:schemeClr val="accent1"/>
-                </a:effectRef>
-                <a:fontRef idx="minor">
-                  <a:schemeClr val="lt1"/>
-                </a:fontRef>
-              </p:style>
-              <p:txBody>
-                <a:bodyPr rtlCol="0" anchor="ctr"/>
-                <a:lstStyle/>
-                <a:p>
-                  <a:pPr algn="ctr"/>
-                  <a:endParaRPr lang="en-QA"/>
-                </a:p>
-              </p:txBody>
-            </p:sp>
-          </p:grpSp>
-          <p:sp>
-            <p:nvSpPr>
-              <p:cNvPr id="13" name="Pie 12">
-                <a:extLst>
-                  <a:ext uri="{FF2B5EF4-FFF2-40B4-BE49-F238E27FC236}">
-                    <a16:creationId xmlns:a16="http://schemas.microsoft.com/office/drawing/2014/main" id="{597E1B90-BD26-B541-BBB8-67143EF37248}"/>
-                  </a:ext>
-                </a:extLst>
-              </p:cNvPr>
-              <p:cNvSpPr>
-                <a:spLocks noChangeAspect="1"/>
-              </p:cNvSpPr>
-              <p:nvPr/>
-            </p:nvSpPr>
-            <p:spPr>
-              <a:xfrm rot="16200000">
-                <a:off x="5016000" y="2384974"/>
-                <a:ext cx="2160000" cy="2160000"/>
-              </a:xfrm>
-              <a:prstGeom prst="pie">
-                <a:avLst>
-                  <a:gd name="adj1" fmla="val 0"/>
-                  <a:gd name="adj2" fmla="val 10812754"/>
-                </a:avLst>
-              </a:prstGeom>
-              <a:solidFill>
-                <a:srgbClr val="1976D2"/>
-              </a:solidFill>
-              <a:ln>
-                <a:noFill/>
-              </a:ln>
-            </p:spPr>
-            <p:style>
-              <a:lnRef idx="2">
-                <a:schemeClr val="accent1">
-                  <a:shade val="50000"/>
-                </a:schemeClr>
-              </a:lnRef>
-              <a:fillRef idx="1">
-                <a:schemeClr val="accent1"/>
-              </a:fillRef>
-              <a:effectRef idx="0">
-                <a:schemeClr val="accent1"/>
-              </a:effectRef>
-              <a:fontRef idx="minor">
-                <a:schemeClr val="lt1"/>
-              </a:fontRef>
-            </p:style>
-            <p:txBody>
-              <a:bodyPr rtlCol="0" anchor="ctr"/>
-              <a:lstStyle/>
-              <a:p>
-                <a:pPr algn="ctr"/>
-                <a:endParaRPr lang="en-QA" dirty="0">
-                  <a:solidFill>
-                    <a:schemeClr val="tx1"/>
-                  </a:solidFill>
-                </a:endParaRPr>
-              </a:p>
-            </p:txBody>
-          </p:sp>
-        </p:grpSp>
-        <p:sp>
-          <p:nvSpPr>
-            <p:cNvPr id="2" name="TextBox 1">
-              <a:extLst>
-                <a:ext uri="{FF2B5EF4-FFF2-40B4-BE49-F238E27FC236}">
-                  <a16:creationId xmlns:a16="http://schemas.microsoft.com/office/drawing/2014/main" id="{FC802422-6CF1-F347-917F-7257EAE856F3}"/>
-                </a:ext>
-              </a:extLst>
-            </p:cNvPr>
-            <p:cNvSpPr txBox="1"/>
-            <p:nvPr/>
-          </p:nvSpPr>
-          <p:spPr>
-            <a:xfrm>
-              <a:off x="4319836" y="2818417"/>
-              <a:ext cx="6371959" cy="1107996"/>
-            </a:xfrm>
-            <a:prstGeom prst="rect">
-              <a:avLst/>
-            </a:prstGeom>
-            <a:noFill/>
-          </p:spPr>
-          <p:txBody>
-            <a:bodyPr wrap="square" rtlCol="0">
-              <a:spAutoFit/>
-            </a:bodyPr>
-            <a:lstStyle/>
-            <a:p>
-              <a:r>
-                <a:rPr lang="en-QA" sz="6600" dirty="0">
-                  <a:solidFill>
-                    <a:srgbClr val="1976D2"/>
-                  </a:solidFill>
-                  <a:latin typeface="Roboto" panose="02000000000000000000" pitchFamily="2" charset="0"/>
-                  <a:ea typeface="Roboto" panose="02000000000000000000" pitchFamily="2" charset="0"/>
-                </a:rPr>
-                <a:t>peal the onion</a:t>
-              </a:r>
-            </a:p>
-          </p:txBody>
-        </p:sp>
-      </p:grpSp>
-    </p:spTree>
-    <p:extLst>
-      <p:ext uri="{BB962C8B-B14F-4D97-AF65-F5344CB8AC3E}">
-        <p14:creationId xmlns:p14="http://schemas.microsoft.com/office/powerpoint/2010/main" val="3662425276"/>
-      </p:ext>
-    </p:extLst>
-  </p:cSld>
-  <p:clrMapOvr>
-    <a:masterClrMapping/>
-  </p:clrMapOvr>
-</p:sld>
-</file>
-
-<file path=ppt/slides/slide3.xml><?xml version="1.0" encoding="utf-8"?>
-<p:sld xmlns:a="http://schemas.openxmlformats.org/drawingml/2006/main" xmlns:r="http://schemas.openxmlformats.org/officeDocument/2006/relationships" xmlns:p="http://schemas.openxmlformats.org/presentationml/2006/main">
-  <p:cSld>
-    <p:spTree>
-      <p:nvGrpSpPr>
-        <p:cNvPr id="1" name=""/>
-        <p:cNvGrpSpPr/>
-        <p:nvPr/>
-      </p:nvGrpSpPr>
-      <p:grpSpPr>
-        <a:xfrm>
-          <a:off x="0" y="0"/>
-          <a:ext cx="0" cy="0"/>
-          <a:chOff x="0" y="0"/>
-          <a:chExt cx="0" cy="0"/>
-        </a:xfrm>
-      </p:grpSpPr>
-      <p:grpSp>
-        <p:nvGrpSpPr>
-          <p:cNvPr id="3" name="Group 2">
-            <a:extLst>
-              <a:ext uri="{FF2B5EF4-FFF2-40B4-BE49-F238E27FC236}">
-                <a16:creationId xmlns:a16="http://schemas.microsoft.com/office/drawing/2014/main" id="{C297EBD6-5331-6B47-A583-7662F0BE78FF}"/>
-              </a:ext>
-            </a:extLst>
-          </p:cNvPr>
-          <p:cNvGrpSpPr/>
-          <p:nvPr/>
-        </p:nvGrpSpPr>
-        <p:grpSpPr>
-          <a:xfrm>
-            <a:off x="4497340" y="2599720"/>
-            <a:ext cx="3197319" cy="1658560"/>
-            <a:chOff x="3000281" y="1710917"/>
-            <a:chExt cx="3197319" cy="1658560"/>
-          </a:xfrm>
-        </p:grpSpPr>
-        <p:sp>
-          <p:nvSpPr>
-            <p:cNvPr id="13" name="Rectangle 12">
-              <a:extLst>
-                <a:ext uri="{FF2B5EF4-FFF2-40B4-BE49-F238E27FC236}">
-                  <a16:creationId xmlns:a16="http://schemas.microsoft.com/office/drawing/2014/main" id="{849555D4-522A-7142-A460-D0D5ED4FEBEF}"/>
-                </a:ext>
-              </a:extLst>
-            </p:cNvPr>
-            <p:cNvSpPr/>
-            <p:nvPr/>
-          </p:nvSpPr>
-          <p:spPr>
-            <a:xfrm>
-              <a:off x="3101881" y="1799817"/>
-              <a:ext cx="3095719" cy="1569660"/>
-            </a:xfrm>
-            <a:prstGeom prst="rect">
-              <a:avLst/>
-            </a:prstGeom>
-          </p:spPr>
-          <p:txBody>
-            <a:bodyPr wrap="none">
-              <a:spAutoFit/>
-            </a:bodyPr>
-            <a:lstStyle/>
-            <a:p>
-              <a:r>
-                <a:rPr lang="en-QA" sz="9600" dirty="0">
-                  <a:solidFill>
-                    <a:srgbClr val="FFFFD2"/>
-                  </a:solidFill>
-                  <a:latin typeface="Roboto" panose="02000000000000000000" pitchFamily="2" charset="0"/>
-                  <a:ea typeface="Roboto" panose="02000000000000000000" pitchFamily="2" charset="0"/>
-                </a:rPr>
-                <a:t>Dizzy</a:t>
-              </a:r>
-            </a:p>
-          </p:txBody>
-        </p:sp>
-        <p:sp>
-          <p:nvSpPr>
-            <p:cNvPr id="12" name="Rectangle 11">
-              <a:extLst>
-                <a:ext uri="{FF2B5EF4-FFF2-40B4-BE49-F238E27FC236}">
-                  <a16:creationId xmlns:a16="http://schemas.microsoft.com/office/drawing/2014/main" id="{7B6E33B2-78E6-D843-8C52-2EBFA5AA3F99}"/>
-                </a:ext>
-              </a:extLst>
-            </p:cNvPr>
-            <p:cNvSpPr/>
-            <p:nvPr/>
-          </p:nvSpPr>
-          <p:spPr>
-            <a:xfrm>
-              <a:off x="3076481" y="1777592"/>
-              <a:ext cx="3095719" cy="1569660"/>
-            </a:xfrm>
-            <a:prstGeom prst="rect">
-              <a:avLst/>
-            </a:prstGeom>
-          </p:spPr>
-          <p:txBody>
-            <a:bodyPr wrap="none">
-              <a:spAutoFit/>
-            </a:bodyPr>
-            <a:lstStyle/>
-            <a:p>
-              <a:r>
-                <a:rPr lang="en-QA" sz="9600" dirty="0">
-                  <a:solidFill>
-                    <a:srgbClr val="FFD0D2"/>
-                  </a:solidFill>
-                  <a:latin typeface="Roboto" panose="02000000000000000000" pitchFamily="2" charset="0"/>
-                  <a:ea typeface="Roboto" panose="02000000000000000000" pitchFamily="2" charset="0"/>
-                </a:rPr>
-                <a:t>Dizzy</a:t>
-              </a:r>
-            </a:p>
-          </p:txBody>
-        </p:sp>
-        <p:sp>
-          <p:nvSpPr>
-            <p:cNvPr id="11" name="Rectangle 10">
-              <a:extLst>
-                <a:ext uri="{FF2B5EF4-FFF2-40B4-BE49-F238E27FC236}">
-                  <a16:creationId xmlns:a16="http://schemas.microsoft.com/office/drawing/2014/main" id="{D9E2FFFE-9F29-E74D-B505-6B33678AA9AF}"/>
-                </a:ext>
-              </a:extLst>
-            </p:cNvPr>
-            <p:cNvSpPr/>
-            <p:nvPr/>
-          </p:nvSpPr>
-          <p:spPr>
-            <a:xfrm>
-              <a:off x="3051081" y="1755367"/>
-              <a:ext cx="3095719" cy="1569660"/>
-            </a:xfrm>
-            <a:prstGeom prst="rect">
-              <a:avLst/>
-            </a:prstGeom>
-          </p:spPr>
-          <p:txBody>
-            <a:bodyPr wrap="none">
-              <a:spAutoFit/>
-            </a:bodyPr>
-            <a:lstStyle/>
-            <a:p>
-              <a:r>
-                <a:rPr lang="en-QA" sz="9600" dirty="0">
-                  <a:solidFill>
-                    <a:srgbClr val="7FD0D2"/>
-                  </a:solidFill>
-                  <a:latin typeface="Roboto" panose="02000000000000000000" pitchFamily="2" charset="0"/>
-                  <a:ea typeface="Roboto" panose="02000000000000000000" pitchFamily="2" charset="0"/>
-                </a:rPr>
-                <a:t>Dizzy</a:t>
-              </a:r>
-            </a:p>
-          </p:txBody>
-        </p:sp>
-        <p:sp>
-          <p:nvSpPr>
-            <p:cNvPr id="9" name="Rectangle 8">
-              <a:extLst>
-                <a:ext uri="{FF2B5EF4-FFF2-40B4-BE49-F238E27FC236}">
-                  <a16:creationId xmlns:a16="http://schemas.microsoft.com/office/drawing/2014/main" id="{CDC257BD-8F92-C949-A36F-0BBF0C1FD72E}"/>
-                </a:ext>
-              </a:extLst>
-            </p:cNvPr>
-            <p:cNvSpPr/>
-            <p:nvPr/>
-          </p:nvSpPr>
-          <p:spPr>
-            <a:xfrm>
-              <a:off x="3025681" y="1733142"/>
-              <a:ext cx="3095719" cy="1569660"/>
-            </a:xfrm>
-            <a:prstGeom prst="rect">
-              <a:avLst/>
-            </a:prstGeom>
-          </p:spPr>
-          <p:txBody>
-            <a:bodyPr wrap="none">
-              <a:spAutoFit/>
-            </a:bodyPr>
-            <a:lstStyle/>
-            <a:p>
-              <a:r>
-                <a:rPr lang="en-QA" sz="9600" dirty="0">
-                  <a:solidFill>
-                    <a:srgbClr val="8376D2"/>
-                  </a:solidFill>
-                  <a:latin typeface="Roboto" panose="02000000000000000000" pitchFamily="2" charset="0"/>
-                  <a:ea typeface="Roboto" panose="02000000000000000000" pitchFamily="2" charset="0"/>
-                </a:rPr>
-                <a:t>Dizzy</a:t>
-              </a:r>
-            </a:p>
-          </p:txBody>
-        </p:sp>
-        <p:sp>
-          <p:nvSpPr>
-            <p:cNvPr id="2" name="Rectangle 1">
-              <a:extLst>
-                <a:ext uri="{FF2B5EF4-FFF2-40B4-BE49-F238E27FC236}">
-                  <a16:creationId xmlns:a16="http://schemas.microsoft.com/office/drawing/2014/main" id="{26196DDA-54FF-5840-B2CB-3E50532D78CC}"/>
-                </a:ext>
-              </a:extLst>
-            </p:cNvPr>
-            <p:cNvSpPr/>
-            <p:nvPr/>
-          </p:nvSpPr>
-          <p:spPr>
-            <a:xfrm>
-              <a:off x="3000281" y="1710917"/>
-              <a:ext cx="3095719" cy="1569660"/>
-            </a:xfrm>
-            <a:prstGeom prst="rect">
-              <a:avLst/>
-            </a:prstGeom>
-          </p:spPr>
-          <p:txBody>
-            <a:bodyPr wrap="none">
-              <a:spAutoFit/>
-            </a:bodyPr>
-            <a:lstStyle/>
-            <a:p>
-              <a:r>
-                <a:rPr lang="en-QA" sz="9600" dirty="0">
-                  <a:solidFill>
-                    <a:srgbClr val="1976D2"/>
-                  </a:solidFill>
-                  <a:latin typeface="Roboto" panose="02000000000000000000" pitchFamily="2" charset="0"/>
-                  <a:ea typeface="Roboto" panose="02000000000000000000" pitchFamily="2" charset="0"/>
-                </a:rPr>
-                <a:t>Dizzy</a:t>
-              </a:r>
-            </a:p>
-          </p:txBody>
-        </p:sp>
-      </p:grpSp>
-    </p:spTree>
-    <p:extLst>
-      <p:ext uri="{BB962C8B-B14F-4D97-AF65-F5344CB8AC3E}">
-        <p14:creationId xmlns:p14="http://schemas.microsoft.com/office/powerpoint/2010/main" val="4279981495"/>
+        <p14:creationId xmlns:p14="http://schemas.microsoft.com/office/powerpoint/2010/main" val="4061333849"/>
       </p:ext>
     </p:extLst>
   </p:cSld>

</xml_diff>